<commit_message>
Merged in some of Craig's suggestions, added market chart
</commit_message>
<xml_diff>
--- a/slides/initial-10-slide-pitch.pptx
+++ b/slides/initial-10-slide-pitch.pptx
@@ -1,6 +1,6 @@
 
 <file path=ppt/presentation.xml><?xml version="1.0" encoding="utf-8"?>
-<p:presentation xmlns:a="http://schemas.openxmlformats.org/drawingml/2006/main" xmlns:r="http://schemas.openxmlformats.org/officeDocument/2006/relationships" xmlns:mc="http://schemas.openxmlformats.org/markup-compatibility/2006" xmlns:mv="urn:schemas-microsoft-com:mac:vml" xmlns:p="http://schemas.openxmlformats.org/presentationml/2006/main" mc:Ignorable="mv" mc:PreserveAttributes="mv:*" saveSubsetFonts="1" autoCompressPictures="0">
+<p:presentation xmlns:a="http://schemas.openxmlformats.org/drawingml/2006/main" xmlns:r="http://schemas.openxmlformats.org/officeDocument/2006/relationships" xmlns:p="http://schemas.openxmlformats.org/presentationml/2006/main" saveSubsetFonts="1" autoCompressPictures="0">
   <p:sldMasterIdLst>
     <p:sldMasterId id="2147483648" r:id="rId1"/>
   </p:sldMasterIdLst>
@@ -117,7 +117,7 @@
 </file>
 
 <file path=ppt/slideLayouts/slideLayout1.xml><?xml version="1.0" encoding="utf-8"?>
-<p:sldLayout xmlns:a="http://schemas.openxmlformats.org/drawingml/2006/main" xmlns:r="http://schemas.openxmlformats.org/officeDocument/2006/relationships" xmlns:mc="http://schemas.openxmlformats.org/markup-compatibility/2006" xmlns:mv="urn:schemas-microsoft-com:mac:vml" xmlns:p="http://schemas.openxmlformats.org/presentationml/2006/main" mc:Ignorable="mv" mc:PreserveAttributes="mv:*" type="title" preserve="1">
+<p:sldLayout xmlns:a="http://schemas.openxmlformats.org/drawingml/2006/main" xmlns:r="http://schemas.openxmlformats.org/officeDocument/2006/relationships" xmlns:p="http://schemas.openxmlformats.org/presentationml/2006/main" type="title" preserve="1">
   <p:cSld name="Title Slide">
     <p:spTree>
       <p:nvGrpSpPr>
@@ -354,7 +354,7 @@
 </file>
 
 <file path=ppt/slideLayouts/slideLayout10.xml><?xml version="1.0" encoding="utf-8"?>
-<p:sldLayout xmlns:a="http://schemas.openxmlformats.org/drawingml/2006/main" xmlns:r="http://schemas.openxmlformats.org/officeDocument/2006/relationships" xmlns:mc="http://schemas.openxmlformats.org/markup-compatibility/2006" xmlns:mv="urn:schemas-microsoft-com:mac:vml" xmlns:p="http://schemas.openxmlformats.org/presentationml/2006/main" mc:Ignorable="mv" mc:PreserveAttributes="mv:*" type="vertTx" preserve="1">
+<p:sldLayout xmlns:a="http://schemas.openxmlformats.org/drawingml/2006/main" xmlns:r="http://schemas.openxmlformats.org/officeDocument/2006/relationships" xmlns:p="http://schemas.openxmlformats.org/presentationml/2006/main" type="vertTx" preserve="1">
   <p:cSld name="Title and Vertical Text">
     <p:spTree>
       <p:nvGrpSpPr>
@@ -519,7 +519,7 @@
 </file>
 
 <file path=ppt/slideLayouts/slideLayout11.xml><?xml version="1.0" encoding="utf-8"?>
-<p:sldLayout xmlns:a="http://schemas.openxmlformats.org/drawingml/2006/main" xmlns:r="http://schemas.openxmlformats.org/officeDocument/2006/relationships" xmlns:mc="http://schemas.openxmlformats.org/markup-compatibility/2006" xmlns:mv="urn:schemas-microsoft-com:mac:vml" xmlns:p="http://schemas.openxmlformats.org/presentationml/2006/main" mc:Ignorable="mv" mc:PreserveAttributes="mv:*" type="vertTitleAndTx" preserve="1">
+<p:sldLayout xmlns:a="http://schemas.openxmlformats.org/drawingml/2006/main" xmlns:r="http://schemas.openxmlformats.org/officeDocument/2006/relationships" xmlns:p="http://schemas.openxmlformats.org/presentationml/2006/main" type="vertTitleAndTx" preserve="1">
   <p:cSld name="Vertical Title and Text">
     <p:spTree>
       <p:nvGrpSpPr>
@@ -694,7 +694,7 @@
 </file>
 
 <file path=ppt/slideLayouts/slideLayout2.xml><?xml version="1.0" encoding="utf-8"?>
-<p:sldLayout xmlns:a="http://schemas.openxmlformats.org/drawingml/2006/main" xmlns:r="http://schemas.openxmlformats.org/officeDocument/2006/relationships" xmlns:mc="http://schemas.openxmlformats.org/markup-compatibility/2006" xmlns:mv="urn:schemas-microsoft-com:mac:vml" xmlns:p="http://schemas.openxmlformats.org/presentationml/2006/main" mc:Ignorable="mv" mc:PreserveAttributes="mv:*" type="obj" preserve="1">
+<p:sldLayout xmlns:a="http://schemas.openxmlformats.org/drawingml/2006/main" xmlns:r="http://schemas.openxmlformats.org/officeDocument/2006/relationships" xmlns:p="http://schemas.openxmlformats.org/presentationml/2006/main" type="obj" preserve="1">
   <p:cSld name="Title and Content">
     <p:spTree>
       <p:nvGrpSpPr>
@@ -859,7 +859,7 @@
 </file>
 
 <file path=ppt/slideLayouts/slideLayout3.xml><?xml version="1.0" encoding="utf-8"?>
-<p:sldLayout xmlns:a="http://schemas.openxmlformats.org/drawingml/2006/main" xmlns:r="http://schemas.openxmlformats.org/officeDocument/2006/relationships" xmlns:mc="http://schemas.openxmlformats.org/markup-compatibility/2006" xmlns:mv="urn:schemas-microsoft-com:mac:vml" xmlns:p="http://schemas.openxmlformats.org/presentationml/2006/main" mc:Ignorable="mv" mc:PreserveAttributes="mv:*" type="secHead" preserve="1">
+<p:sldLayout xmlns:a="http://schemas.openxmlformats.org/drawingml/2006/main" xmlns:r="http://schemas.openxmlformats.org/officeDocument/2006/relationships" xmlns:p="http://schemas.openxmlformats.org/presentationml/2006/main" type="secHead" preserve="1">
   <p:cSld name="Section Header">
     <p:spTree>
       <p:nvGrpSpPr>
@@ -1100,7 +1100,7 @@
 </file>
 
 <file path=ppt/slideLayouts/slideLayout4.xml><?xml version="1.0" encoding="utf-8"?>
-<p:sldLayout xmlns:a="http://schemas.openxmlformats.org/drawingml/2006/main" xmlns:r="http://schemas.openxmlformats.org/officeDocument/2006/relationships" xmlns:mc="http://schemas.openxmlformats.org/markup-compatibility/2006" xmlns:mv="urn:schemas-microsoft-com:mac:vml" xmlns:p="http://schemas.openxmlformats.org/presentationml/2006/main" mc:Ignorable="mv" mc:PreserveAttributes="mv:*" type="twoObj" preserve="1">
+<p:sldLayout xmlns:a="http://schemas.openxmlformats.org/drawingml/2006/main" xmlns:r="http://schemas.openxmlformats.org/officeDocument/2006/relationships" xmlns:p="http://schemas.openxmlformats.org/presentationml/2006/main" type="twoObj" preserve="1">
   <p:cSld name="Two Content">
     <p:spTree>
       <p:nvGrpSpPr>
@@ -1383,7 +1383,7 @@
 </file>
 
 <file path=ppt/slideLayouts/slideLayout5.xml><?xml version="1.0" encoding="utf-8"?>
-<p:sldLayout xmlns:a="http://schemas.openxmlformats.org/drawingml/2006/main" xmlns:r="http://schemas.openxmlformats.org/officeDocument/2006/relationships" xmlns:mc="http://schemas.openxmlformats.org/markup-compatibility/2006" xmlns:mv="urn:schemas-microsoft-com:mac:vml" xmlns:p="http://schemas.openxmlformats.org/presentationml/2006/main" mc:Ignorable="mv" mc:PreserveAttributes="mv:*" type="twoTxTwoObj" preserve="1">
+<p:sldLayout xmlns:a="http://schemas.openxmlformats.org/drawingml/2006/main" xmlns:r="http://schemas.openxmlformats.org/officeDocument/2006/relationships" xmlns:p="http://schemas.openxmlformats.org/presentationml/2006/main" type="twoTxTwoObj" preserve="1">
   <p:cSld name="Comparison">
     <p:spTree>
       <p:nvGrpSpPr>
@@ -1800,7 +1800,7 @@
 </file>
 
 <file path=ppt/slideLayouts/slideLayout6.xml><?xml version="1.0" encoding="utf-8"?>
-<p:sldLayout xmlns:a="http://schemas.openxmlformats.org/drawingml/2006/main" xmlns:r="http://schemas.openxmlformats.org/officeDocument/2006/relationships" xmlns:mc="http://schemas.openxmlformats.org/markup-compatibility/2006" xmlns:mv="urn:schemas-microsoft-com:mac:vml" xmlns:p="http://schemas.openxmlformats.org/presentationml/2006/main" mc:Ignorable="mv" mc:PreserveAttributes="mv:*" type="titleOnly" preserve="1">
+<p:sldLayout xmlns:a="http://schemas.openxmlformats.org/drawingml/2006/main" xmlns:r="http://schemas.openxmlformats.org/officeDocument/2006/relationships" xmlns:p="http://schemas.openxmlformats.org/presentationml/2006/main" type="titleOnly" preserve="1">
   <p:cSld name="Title Only">
     <p:spTree>
       <p:nvGrpSpPr>
@@ -1913,7 +1913,7 @@
 </file>
 
 <file path=ppt/slideLayouts/slideLayout7.xml><?xml version="1.0" encoding="utf-8"?>
-<p:sldLayout xmlns:a="http://schemas.openxmlformats.org/drawingml/2006/main" xmlns:r="http://schemas.openxmlformats.org/officeDocument/2006/relationships" xmlns:mc="http://schemas.openxmlformats.org/markup-compatibility/2006" xmlns:mv="urn:schemas-microsoft-com:mac:vml" xmlns:p="http://schemas.openxmlformats.org/presentationml/2006/main" mc:Ignorable="mv" mc:PreserveAttributes="mv:*" type="blank" preserve="1">
+<p:sldLayout xmlns:a="http://schemas.openxmlformats.org/drawingml/2006/main" xmlns:r="http://schemas.openxmlformats.org/officeDocument/2006/relationships" xmlns:p="http://schemas.openxmlformats.org/presentationml/2006/main" type="blank" preserve="1">
   <p:cSld name="Blank">
     <p:spTree>
       <p:nvGrpSpPr>
@@ -2003,7 +2003,7 @@
 </file>
 
 <file path=ppt/slideLayouts/slideLayout8.xml><?xml version="1.0" encoding="utf-8"?>
-<p:sldLayout xmlns:a="http://schemas.openxmlformats.org/drawingml/2006/main" xmlns:r="http://schemas.openxmlformats.org/officeDocument/2006/relationships" xmlns:mc="http://schemas.openxmlformats.org/markup-compatibility/2006" xmlns:mv="urn:schemas-microsoft-com:mac:vml" xmlns:p="http://schemas.openxmlformats.org/presentationml/2006/main" mc:Ignorable="mv" mc:PreserveAttributes="mv:*" type="objTx" preserve="1">
+<p:sldLayout xmlns:a="http://schemas.openxmlformats.org/drawingml/2006/main" xmlns:r="http://schemas.openxmlformats.org/officeDocument/2006/relationships" xmlns:p="http://schemas.openxmlformats.org/presentationml/2006/main" type="objTx" preserve="1">
   <p:cSld name="Content with Caption">
     <p:spTree>
       <p:nvGrpSpPr>
@@ -2275,7 +2275,7 @@
 </file>
 
 <file path=ppt/slideLayouts/slideLayout9.xml><?xml version="1.0" encoding="utf-8"?>
-<p:sldLayout xmlns:a="http://schemas.openxmlformats.org/drawingml/2006/main" xmlns:r="http://schemas.openxmlformats.org/officeDocument/2006/relationships" xmlns:mc="http://schemas.openxmlformats.org/markup-compatibility/2006" xmlns:mv="urn:schemas-microsoft-com:mac:vml" xmlns:p="http://schemas.openxmlformats.org/presentationml/2006/main" mc:Ignorable="mv" mc:PreserveAttributes="mv:*" type="picTx" preserve="1">
+<p:sldLayout xmlns:a="http://schemas.openxmlformats.org/drawingml/2006/main" xmlns:r="http://schemas.openxmlformats.org/officeDocument/2006/relationships" xmlns:p="http://schemas.openxmlformats.org/presentationml/2006/main" type="picTx" preserve="1">
   <p:cSld name="Picture with Caption">
     <p:spTree>
       <p:nvGrpSpPr>
@@ -2523,7 +2523,7 @@
 </file>
 
 <file path=ppt/slideMasters/slideMaster1.xml><?xml version="1.0" encoding="utf-8"?>
-<p:sldMaster xmlns:a="http://schemas.openxmlformats.org/drawingml/2006/main" xmlns:r="http://schemas.openxmlformats.org/officeDocument/2006/relationships" xmlns:mc="http://schemas.openxmlformats.org/markup-compatibility/2006" xmlns:mv="urn:schemas-microsoft-com:mac:vml" xmlns:p="http://schemas.openxmlformats.org/presentationml/2006/main" mc:Ignorable="mv" mc:PreserveAttributes="mv:*">
+<p:sldMaster xmlns:a="http://schemas.openxmlformats.org/drawingml/2006/main" xmlns:r="http://schemas.openxmlformats.org/officeDocument/2006/relationships" xmlns:p="http://schemas.openxmlformats.org/presentationml/2006/main">
   <p:cSld>
     <p:bg>
       <p:bgRef idx="1001">
@@ -3028,7 +3028,7 @@
 </file>
 
 <file path=ppt/slides/slide1.xml><?xml version="1.0" encoding="utf-8"?>
-<p:sld xmlns:a="http://schemas.openxmlformats.org/drawingml/2006/main" xmlns:r="http://schemas.openxmlformats.org/officeDocument/2006/relationships" xmlns:mc="http://schemas.openxmlformats.org/markup-compatibility/2006" xmlns:mv="urn:schemas-microsoft-com:mac:vml" xmlns:p="http://schemas.openxmlformats.org/presentationml/2006/main" mc:Ignorable="mv" mc:PreserveAttributes="mv:*">
+<p:sld xmlns:a="http://schemas.openxmlformats.org/drawingml/2006/main" xmlns:r="http://schemas.openxmlformats.org/officeDocument/2006/relationships" xmlns:p="http://schemas.openxmlformats.org/presentationml/2006/main">
   <p:cSld>
     <p:spTree>
       <p:nvGrpSpPr>
@@ -3098,7 +3098,7 @@
   <p:timing>
     <p:tnLst>
       <p:par>
-        <p:cTn id="1" dur="indefinite" restart="never" nodeType="tmRoot"/>
+        <p:cTn xmlns:p14="http://schemas.microsoft.com/office/powerpoint/2010/main" id="1" dur="indefinite" restart="never" nodeType="tmRoot"/>
       </p:par>
     </p:tnLst>
   </p:timing>
@@ -3106,7 +3106,7 @@
 </file>
 
 <file path=ppt/slides/slide10.xml><?xml version="1.0" encoding="utf-8"?>
-<p:sld xmlns:a="http://schemas.openxmlformats.org/drawingml/2006/main" xmlns:r="http://schemas.openxmlformats.org/officeDocument/2006/relationships" xmlns:mc="http://schemas.openxmlformats.org/markup-compatibility/2006" xmlns:mv="urn:schemas-microsoft-com:mac:vml" xmlns:p="http://schemas.openxmlformats.org/presentationml/2006/main" mc:Ignorable="mv" mc:PreserveAttributes="mv:*">
+<p:sld xmlns:a="http://schemas.openxmlformats.org/drawingml/2006/main" xmlns:r="http://schemas.openxmlformats.org/officeDocument/2006/relationships" xmlns:p="http://schemas.openxmlformats.org/presentationml/2006/main">
   <p:cSld>
     <p:spTree>
       <p:nvGrpSpPr>
@@ -3189,7 +3189,7 @@
 </file>
 
 <file path=ppt/slides/slide2.xml><?xml version="1.0" encoding="utf-8"?>
-<p:sld xmlns:a="http://schemas.openxmlformats.org/drawingml/2006/main" xmlns:r="http://schemas.openxmlformats.org/officeDocument/2006/relationships" xmlns:mc="http://schemas.openxmlformats.org/markup-compatibility/2006" xmlns:mv="urn:schemas-microsoft-com:mac:vml" xmlns:p="http://schemas.openxmlformats.org/presentationml/2006/main" mc:Ignorable="mv" mc:PreserveAttributes="mv:*">
+<p:sld xmlns:a="http://schemas.openxmlformats.org/drawingml/2006/main" xmlns:r="http://schemas.openxmlformats.org/officeDocument/2006/relationships" xmlns:p="http://schemas.openxmlformats.org/presentationml/2006/main">
   <p:cSld>
     <p:spTree>
       <p:nvGrpSpPr>
@@ -3259,12 +3259,40 @@
           <a:p>
             <a:pPr marL="457200"/>
             <a:r>
-              <a:rPr lang="en-US" sz="2000" dirty="0"/>
-              <a:t>M</a:t>
-            </a:r>
-            <a:r>
               <a:rPr lang="en-US" sz="2000" dirty="0" smtClean="0"/>
-              <a:t>easurement, design, art, and manufacturing will take full advantage of the accuracy and speed of 3D scanning.</a:t>
+              <a:t>All working in measurement, d</a:t>
+            </a:r>
+            <a:r>
+              <a:rPr lang="en-US" sz="2000" dirty="0" smtClean="0"/>
+              <a:t>esign</a:t>
+            </a:r>
+            <a:r>
+              <a:rPr lang="en-US" sz="2000" dirty="0" smtClean="0"/>
+              <a:t>, art, and </a:t>
+            </a:r>
+            <a:r>
+              <a:rPr lang="en-US" sz="2000" dirty="0" smtClean="0"/>
+              <a:t>manufacturing will soon take advantage </a:t>
+            </a:r>
+            <a:r>
+              <a:rPr lang="en-US" sz="2000" dirty="0" smtClean="0"/>
+              <a:t>of the </a:t>
+            </a:r>
+            <a:r>
+              <a:rPr lang="en-US" sz="2000" dirty="0" smtClean="0"/>
+              <a:t>accuracy </a:t>
+            </a:r>
+            <a:r>
+              <a:rPr lang="en-US" sz="2000" dirty="0" smtClean="0"/>
+              <a:t>and speed of 3D </a:t>
+            </a:r>
+            <a:r>
+              <a:rPr lang="en-US" sz="2000" dirty="0" smtClean="0"/>
+              <a:t>scanning.</a:t>
+            </a:r>
+            <a:r>
+              <a:rPr lang="en-US" sz="2000" dirty="0" smtClean="0"/>
+              <a:t/>
             </a:r>
             <a:br>
               <a:rPr lang="en-US" sz="2000" dirty="0" smtClean="0"/>
@@ -3295,7 +3323,7 @@
   <p:timing>
     <p:tnLst>
       <p:par>
-        <p:cTn id="1" dur="indefinite" restart="never" nodeType="tmRoot"/>
+        <p:cTn xmlns:p14="http://schemas.microsoft.com/office/powerpoint/2010/main" id="1" dur="indefinite" restart="never" nodeType="tmRoot"/>
       </p:par>
     </p:tnLst>
   </p:timing>
@@ -3303,7 +3331,7 @@
 </file>
 
 <file path=ppt/slides/slide3.xml><?xml version="1.0" encoding="utf-8"?>
-<p:sld xmlns:a="http://schemas.openxmlformats.org/drawingml/2006/main" xmlns:r="http://schemas.openxmlformats.org/officeDocument/2006/relationships" xmlns:mc="http://schemas.openxmlformats.org/markup-compatibility/2006" xmlns:mv="urn:schemas-microsoft-com:mac:vml" xmlns:p="http://schemas.openxmlformats.org/presentationml/2006/main" mc:Ignorable="mv" mc:PreserveAttributes="mv:*">
+<p:sld xmlns:a="http://schemas.openxmlformats.org/drawingml/2006/main" xmlns:r="http://schemas.openxmlformats.org/officeDocument/2006/relationships" xmlns:p="http://schemas.openxmlformats.org/presentationml/2006/main">
   <p:cSld>
     <p:spTree>
       <p:nvGrpSpPr>
@@ -3352,9 +3380,16 @@
             <p:ph idx="1"/>
           </p:nvPr>
         </p:nvSpPr>
-        <p:spPr/>
-        <p:txBody>
-          <a:bodyPr/>
+        <p:spPr>
+          <a:xfrm>
+            <a:off x="457200" y="1600200"/>
+            <a:ext cx="4119090" cy="4525963"/>
+          </a:xfrm>
+        </p:spPr>
+        <p:txBody>
+          <a:bodyPr>
+            <a:normAutofit fontScale="92500" lnSpcReduction="20000"/>
+          </a:bodyPr>
           <a:lstStyle/>
           <a:p>
             <a:r>
@@ -3394,17 +3429,18 @@
             <a:pPr lvl="1"/>
             <a:r>
               <a:rPr lang="en-US" dirty="0" smtClean="0"/>
-              <a:t>Small manufactures</a:t>
-            </a:r>
-          </a:p>
-          <a:p>
+              <a:t>Small </a:t>
+            </a:r>
             <a:r>
               <a:rPr lang="en-US" dirty="0" smtClean="0"/>
-              <a:t>Sales of other 3D Scanners</a:t>
-            </a:r>
-          </a:p>
-          <a:p>
-            <a:pPr lvl="1"/>
+              <a:t>manufactures</a:t>
+            </a:r>
+          </a:p>
+          <a:p>
+            <a:r>
+              <a:rPr lang="en-US" dirty="0" smtClean="0"/>
+              <a:t>Interest and growth in 3D printing is expanding wildly.  3D scanning is the other part of this revolution</a:t>
+            </a:r>
             <a:endParaRPr lang="en-US" dirty="0" smtClean="0"/>
           </a:p>
           <a:p>
@@ -3470,6 +3506,107 @@
           </a:p>
         </p:txBody>
       </p:sp>
+      <p:pic>
+        <p:nvPicPr>
+          <p:cNvPr id="6" name="Picture 5"/>
+          <p:cNvPicPr>
+            <a:picLocks noChangeAspect="1"/>
+          </p:cNvPicPr>
+          <p:nvPr/>
+        </p:nvPicPr>
+        <p:blipFill rotWithShape="1">
+          <a:blip r:embed="rId2"/>
+          <a:srcRect l="2961" t="3290" r="2324" b="6903"/>
+          <a:stretch/>
+        </p:blipFill>
+        <p:spPr>
+          <a:xfrm>
+            <a:off x="5002882" y="2168657"/>
+            <a:ext cx="3535185" cy="3297468"/>
+          </a:xfrm>
+          <a:prstGeom prst="rect">
+            <a:avLst/>
+          </a:prstGeom>
+        </p:spPr>
+      </p:pic>
+      <p:sp>
+        <p:nvSpPr>
+          <p:cNvPr id="7" name="TextBox 6"/>
+          <p:cNvSpPr txBox="1"/>
+          <p:nvPr/>
+        </p:nvSpPr>
+        <p:spPr>
+          <a:xfrm>
+            <a:off x="5002882" y="5466125"/>
+            <a:ext cx="3535185" cy="400110"/>
+          </a:xfrm>
+          <a:prstGeom prst="rect">
+            <a:avLst/>
+          </a:prstGeom>
+          <a:noFill/>
+        </p:spPr>
+        <p:txBody>
+          <a:bodyPr wrap="square" rtlCol="0">
+            <a:spAutoFit/>
+          </a:bodyPr>
+          <a:lstStyle/>
+          <a:p>
+            <a:r>
+              <a:rPr lang="en-US" sz="1000" i="1" dirty="0" smtClean="0"/>
+              <a:t>Data from </a:t>
+            </a:r>
+            <a:r>
+              <a:rPr lang="en-US" sz="1000" i="1" dirty="0" err="1" smtClean="0"/>
+              <a:t>Wohlers</a:t>
+            </a:r>
+            <a:r>
+              <a:rPr lang="en-US" sz="1000" i="1" dirty="0" smtClean="0"/>
+              <a:t> Report 2012: Additive Manufacturing and 3D Printing State of the Industry</a:t>
+            </a:r>
+            <a:endParaRPr lang="en-US" sz="1000" i="1" dirty="0"/>
+          </a:p>
+        </p:txBody>
+      </p:sp>
+      <p:sp>
+        <p:nvSpPr>
+          <p:cNvPr id="8" name="TextBox 7"/>
+          <p:cNvSpPr txBox="1"/>
+          <p:nvPr/>
+        </p:nvSpPr>
+        <p:spPr>
+          <a:xfrm>
+            <a:off x="5002882" y="1600200"/>
+            <a:ext cx="3535185" cy="584776"/>
+          </a:xfrm>
+          <a:prstGeom prst="rect">
+            <a:avLst/>
+          </a:prstGeom>
+          <a:noFill/>
+        </p:spPr>
+        <p:txBody>
+          <a:bodyPr wrap="square" rtlCol="0">
+            <a:spAutoFit/>
+          </a:bodyPr>
+          <a:lstStyle/>
+          <a:p>
+            <a:r>
+              <a:rPr lang="en-US" sz="2000" dirty="0" smtClean="0"/>
+              <a:t>Global personal 3D printer sales </a:t>
+            </a:r>
+          </a:p>
+          <a:p>
+            <a:r>
+              <a:rPr lang="en-US" sz="1200" dirty="0"/>
+              <a:t>M</a:t>
+            </a:r>
+            <a:r>
+              <a:rPr lang="en-US" sz="1200" dirty="0" smtClean="0"/>
+              <a:t>achines or kits priced between $500 and $4,000</a:t>
+            </a:r>
+            <a:endParaRPr lang="en-US" sz="1200" dirty="0"/>
+          </a:p>
+        </p:txBody>
+      </p:sp>
     </p:spTree>
   </p:cSld>
   <p:clrMapOvr>
@@ -3479,7 +3616,7 @@
 </file>
 
 <file path=ppt/slides/slide4.xml><?xml version="1.0" encoding="utf-8"?>
-<p:sld xmlns:a="http://schemas.openxmlformats.org/drawingml/2006/main" xmlns:r="http://schemas.openxmlformats.org/officeDocument/2006/relationships" xmlns:mc="http://schemas.openxmlformats.org/markup-compatibility/2006" xmlns:mv="urn:schemas-microsoft-com:mac:vml" xmlns:p="http://schemas.openxmlformats.org/presentationml/2006/main" mc:Ignorable="mv" mc:PreserveAttributes="mv:*">
+<p:sld xmlns:a="http://schemas.openxmlformats.org/drawingml/2006/main" xmlns:r="http://schemas.openxmlformats.org/officeDocument/2006/relationships" xmlns:p="http://schemas.openxmlformats.org/presentationml/2006/main">
   <p:cSld>
     <p:spTree>
       <p:nvGrpSpPr>
@@ -3531,13 +3668,21 @@
         <p:spPr/>
         <p:txBody>
           <a:bodyPr>
-            <a:normAutofit lnSpcReduction="10000"/>
+            <a:normAutofit/>
           </a:bodyPr>
           <a:lstStyle/>
           <a:p>
             <a:r>
               <a:rPr lang="en-US" dirty="0" smtClean="0"/>
-              <a:t>Optics and Digital Imaging - Partially driven by increasing demand for high-quality, compact, and cheap cell phone cameras</a:t>
+              <a:t>Optics and Digital Imaging </a:t>
+            </a:r>
+            <a:r>
+              <a:rPr lang="en-US" dirty="0" smtClean="0"/>
+              <a:t>– Notably emergence of </a:t>
+            </a:r>
+            <a:r>
+              <a:rPr lang="en-US" dirty="0" smtClean="0"/>
+              <a:t>high-quality, compact, and cheap cell phone cameras</a:t>
             </a:r>
           </a:p>
           <a:p>
@@ -3566,7 +3711,7 @@
 </file>
 
 <file path=ppt/slides/slide5.xml><?xml version="1.0" encoding="utf-8"?>
-<p:sld xmlns:a="http://schemas.openxmlformats.org/drawingml/2006/main" xmlns:r="http://schemas.openxmlformats.org/officeDocument/2006/relationships" xmlns:mc="http://schemas.openxmlformats.org/markup-compatibility/2006" xmlns:mv="urn:schemas-microsoft-com:mac:vml" xmlns:p="http://schemas.openxmlformats.org/presentationml/2006/main" mc:Ignorable="mv" mc:PreserveAttributes="mv:*">
+<p:sld xmlns:a="http://schemas.openxmlformats.org/drawingml/2006/main" xmlns:r="http://schemas.openxmlformats.org/officeDocument/2006/relationships" xmlns:p="http://schemas.openxmlformats.org/presentationml/2006/main">
   <p:cSld>
     <p:spTree>
       <p:nvGrpSpPr>
@@ -3618,7 +3763,7 @@
         <p:spPr/>
         <p:txBody>
           <a:bodyPr>
-            <a:normAutofit fontScale="92500" lnSpcReduction="20000"/>
+            <a:normAutofit fontScale="92500" lnSpcReduction="10000"/>
           </a:bodyPr>
           <a:lstStyle/>
           <a:p>
@@ -3679,7 +3824,19 @@
           <a:p>
             <a:r>
               <a:rPr lang="en-US" dirty="0" smtClean="0"/>
-              <a:t>Recent interest in 3D scanning has spurred academic research in the subject, especially in structured light and image reconstruction methods</a:t>
+              <a:t>Recent interest in 3D scanning has spurred academic research </a:t>
+            </a:r>
+            <a:r>
+              <a:rPr lang="en-US" dirty="0" smtClean="0"/>
+              <a:t>advances, particularly in </a:t>
+            </a:r>
+            <a:r>
+              <a:rPr lang="en-US" dirty="0" smtClean="0"/>
+              <a:t>structured light and image </a:t>
+            </a:r>
+            <a:r>
+              <a:rPr lang="en-US" dirty="0" smtClean="0"/>
+              <a:t>reconstruction</a:t>
             </a:r>
             <a:endParaRPr lang="en-US" dirty="0"/>
           </a:p>
@@ -3694,7 +3851,7 @@
 </file>
 
 <file path=ppt/slides/slide6.xml><?xml version="1.0" encoding="utf-8"?>
-<p:sld xmlns:a="http://schemas.openxmlformats.org/drawingml/2006/main" xmlns:r="http://schemas.openxmlformats.org/officeDocument/2006/relationships" xmlns:mc="http://schemas.openxmlformats.org/markup-compatibility/2006" xmlns:mv="urn:schemas-microsoft-com:mac:vml" xmlns:p="http://schemas.openxmlformats.org/presentationml/2006/main" mc:Ignorable="mv" mc:PreserveAttributes="mv:*">
+<p:sld xmlns:a="http://schemas.openxmlformats.org/drawingml/2006/main" xmlns:r="http://schemas.openxmlformats.org/officeDocument/2006/relationships" xmlns:p="http://schemas.openxmlformats.org/presentationml/2006/main">
   <p:cSld>
     <p:spTree>
       <p:nvGrpSpPr>
@@ -3951,7 +4108,7 @@
 </file>
 
 <file path=ppt/slides/slide7.xml><?xml version="1.0" encoding="utf-8"?>
-<p:sld xmlns:a="http://schemas.openxmlformats.org/drawingml/2006/main" xmlns:r="http://schemas.openxmlformats.org/officeDocument/2006/relationships" xmlns:mc="http://schemas.openxmlformats.org/markup-compatibility/2006" xmlns:mv="urn:schemas-microsoft-com:mac:vml" xmlns:p="http://schemas.openxmlformats.org/presentationml/2006/main" mc:Ignorable="mv" mc:PreserveAttributes="mv:*">
+<p:sld xmlns:a="http://schemas.openxmlformats.org/drawingml/2006/main" xmlns:r="http://schemas.openxmlformats.org/officeDocument/2006/relationships" xmlns:p="http://schemas.openxmlformats.org/presentationml/2006/main">
   <p:cSld>
     <p:spTree>
       <p:nvGrpSpPr>
@@ -4116,7 +4273,7 @@
 </file>
 
 <file path=ppt/slides/slide8.xml><?xml version="1.0" encoding="utf-8"?>
-<p:sld xmlns:a="http://schemas.openxmlformats.org/drawingml/2006/main" xmlns:r="http://schemas.openxmlformats.org/officeDocument/2006/relationships" xmlns:mc="http://schemas.openxmlformats.org/markup-compatibility/2006" xmlns:mv="urn:schemas-microsoft-com:mac:vml" xmlns:p="http://schemas.openxmlformats.org/presentationml/2006/main" mc:Ignorable="mv" mc:PreserveAttributes="mv:*">
+<p:sld xmlns:a="http://schemas.openxmlformats.org/drawingml/2006/main" xmlns:r="http://schemas.openxmlformats.org/officeDocument/2006/relationships" xmlns:p="http://schemas.openxmlformats.org/presentationml/2006/main">
   <p:cSld>
     <p:spTree>
       <p:nvGrpSpPr>
@@ -4157,7 +4314,7 @@
       </p:sp>
       <p:pic>
         <p:nvPicPr>
-          <p:cNvPr id="4" name="Picture 3" descr="Screen Shot 2013-03-04 at 11.02.34 PM.png"/>
+          <p:cNvPr id="6" name="Picture 5" descr="Screen Shot 2013-03-04 at 11.05.25 PM.png"/>
           <p:cNvPicPr>
             <a:picLocks noChangeAspect="1"/>
           </p:cNvPicPr>
@@ -4165,115 +4322,6 @@
         </p:nvPicPr>
         <p:blipFill>
           <a:blip r:embed="rId2"/>
-          <a:stretch>
-            <a:fillRect/>
-          </a:stretch>
-        </p:blipFill>
-        <p:spPr>
-          <a:xfrm>
-            <a:off x="457200" y="4449936"/>
-            <a:ext cx="1266641" cy="1295169"/>
-          </a:xfrm>
-          <a:prstGeom prst="rect">
-            <a:avLst/>
-          </a:prstGeom>
-          <a:solidFill>
-            <a:srgbClr val="FFFFFF">
-              <a:shade val="85000"/>
-            </a:srgbClr>
-          </a:solidFill>
-          <a:ln w="88900" cap="sq">
-            <a:solidFill>
-              <a:srgbClr val="FFFFFF"/>
-            </a:solidFill>
-            <a:miter lim="800000"/>
-          </a:ln>
-          <a:effectLst>
-            <a:outerShdw blurRad="55000" dist="18000" dir="5400000" algn="tl" rotWithShape="0">
-              <a:srgbClr val="000000">
-                <a:alpha val="40000"/>
-              </a:srgbClr>
-            </a:outerShdw>
-          </a:effectLst>
-          <a:scene3d>
-            <a:camera prst="orthographicFront"/>
-            <a:lightRig rig="twoPt" dir="t">
-              <a:rot lat="0" lon="0" rev="7200000"/>
-            </a:lightRig>
-          </a:scene3d>
-          <a:sp3d>
-            <a:bevelT w="25400" h="19050"/>
-            <a:contourClr>
-              <a:srgbClr val="FFFFFF"/>
-            </a:contourClr>
-          </a:sp3d>
-        </p:spPr>
-      </p:pic>
-      <p:pic>
-        <p:nvPicPr>
-          <p:cNvPr id="5" name="Picture 4" descr="Screen Shot 2013-03-04 at 11.04.47 PM.png"/>
-          <p:cNvPicPr>
-            <a:picLocks noChangeAspect="1"/>
-          </p:cNvPicPr>
-          <p:nvPr/>
-        </p:nvPicPr>
-        <p:blipFill>
-          <a:blip r:embed="rId3"/>
-          <a:srcRect t="8420" b="16602"/>
-          <a:stretch>
-            <a:fillRect/>
-          </a:stretch>
-        </p:blipFill>
-        <p:spPr>
-          <a:xfrm>
-            <a:off x="457200" y="2022582"/>
-            <a:ext cx="1291267" cy="1297898"/>
-          </a:xfrm>
-          <a:prstGeom prst="rect">
-            <a:avLst/>
-          </a:prstGeom>
-          <a:solidFill>
-            <a:srgbClr val="FFFFFF">
-              <a:shade val="85000"/>
-            </a:srgbClr>
-          </a:solidFill>
-          <a:ln w="88900" cap="sq">
-            <a:solidFill>
-              <a:srgbClr val="FFFFFF"/>
-            </a:solidFill>
-            <a:miter lim="800000"/>
-          </a:ln>
-          <a:effectLst>
-            <a:outerShdw blurRad="55000" dist="18000" dir="5400000" algn="tl" rotWithShape="0">
-              <a:srgbClr val="000000">
-                <a:alpha val="40000"/>
-              </a:srgbClr>
-            </a:outerShdw>
-          </a:effectLst>
-          <a:scene3d>
-            <a:camera prst="orthographicFront"/>
-            <a:lightRig rig="twoPt" dir="t">
-              <a:rot lat="0" lon="0" rev="7200000"/>
-            </a:lightRig>
-          </a:scene3d>
-          <a:sp3d>
-            <a:bevelT w="25400" h="19050"/>
-            <a:contourClr>
-              <a:srgbClr val="FFFFFF"/>
-            </a:contourClr>
-          </a:sp3d>
-        </p:spPr>
-      </p:pic>
-      <p:pic>
-        <p:nvPicPr>
-          <p:cNvPr id="6" name="Picture 5" descr="Screen Shot 2013-03-04 at 11.05.25 PM.png"/>
-          <p:cNvPicPr>
-            <a:picLocks noChangeAspect="1"/>
-          </p:cNvPicPr>
-          <p:nvPr/>
-        </p:nvPicPr>
-        <p:blipFill>
-          <a:blip r:embed="rId4"/>
           <a:srcRect b="24009"/>
           <a:stretch>
             <a:fillRect/>
@@ -4281,7 +4329,7 @@
         </p:blipFill>
         <p:spPr>
           <a:xfrm>
-            <a:off x="4700248" y="2022582"/>
+            <a:off x="4700248" y="2001365"/>
             <a:ext cx="1225871" cy="1252323"/>
           </a:xfrm>
           <a:prstGeom prst="rect">
@@ -4328,7 +4376,7 @@
           <p:nvPr/>
         </p:nvPicPr>
         <p:blipFill>
-          <a:blip r:embed="rId5"/>
+          <a:blip r:embed="rId3"/>
           <a:stretch>
             <a:fillRect/>
           </a:stretch>
@@ -4623,6 +4671,119 @@
           </a:p>
         </p:txBody>
       </p:sp>
+      <p:pic>
+        <p:nvPicPr>
+          <p:cNvPr id="3" name="Picture 2" descr="Craig headshot DCBA.jpg"/>
+          <p:cNvPicPr>
+            <a:picLocks noChangeAspect="1"/>
+          </p:cNvPicPr>
+          <p:nvPr/>
+        </p:nvPicPr>
+        <p:blipFill rotWithShape="1">
+          <a:blip r:embed="rId4">
+            <a:extLst>
+              <a:ext uri="{28A0092B-C50C-407E-A947-70E740481C1C}">
+                <a14:useLocalDpi xmlns:a14="http://schemas.microsoft.com/office/drawing/2010/main" val="0"/>
+              </a:ext>
+            </a:extLst>
+          </a:blip>
+          <a:srcRect t="3841" b="12226"/>
+          <a:stretch/>
+        </p:blipFill>
+        <p:spPr>
+          <a:xfrm>
+            <a:off x="531718" y="4449936"/>
+            <a:ext cx="1293464" cy="1292128"/>
+          </a:xfrm>
+          <a:prstGeom prst="rect">
+            <a:avLst/>
+          </a:prstGeom>
+          <a:solidFill>
+            <a:srgbClr val="FFFFFF">
+              <a:shade val="85000"/>
+            </a:srgbClr>
+          </a:solidFill>
+          <a:ln w="88900" cap="sq">
+            <a:solidFill>
+              <a:srgbClr val="FFFFFF"/>
+            </a:solidFill>
+            <a:miter lim="800000"/>
+          </a:ln>
+          <a:effectLst>
+            <a:outerShdw blurRad="55000" dist="18000" dir="5400000" algn="tl" rotWithShape="0">
+              <a:srgbClr val="000000">
+                <a:alpha val="40000"/>
+              </a:srgbClr>
+            </a:outerShdw>
+          </a:effectLst>
+          <a:scene3d>
+            <a:camera prst="orthographicFront"/>
+            <a:lightRig rig="twoPt" dir="t">
+              <a:rot lat="0" lon="0" rev="7200000"/>
+            </a:lightRig>
+          </a:scene3d>
+          <a:sp3d>
+            <a:bevelT w="25400" h="19050"/>
+            <a:contourClr>
+              <a:srgbClr val="FFFFFF"/>
+            </a:contourClr>
+          </a:sp3d>
+        </p:spPr>
+      </p:pic>
+      <p:pic>
+        <p:nvPicPr>
+          <p:cNvPr id="12" name="Picture 11"/>
+          <p:cNvPicPr>
+            <a:picLocks noChangeAspect="1"/>
+          </p:cNvPicPr>
+          <p:nvPr/>
+        </p:nvPicPr>
+        <p:blipFill>
+          <a:blip r:embed="rId5"/>
+          <a:stretch>
+            <a:fillRect/>
+          </a:stretch>
+        </p:blipFill>
+        <p:spPr>
+          <a:xfrm>
+            <a:off x="531718" y="1979359"/>
+            <a:ext cx="1295546" cy="1295546"/>
+          </a:xfrm>
+          <a:prstGeom prst="rect">
+            <a:avLst/>
+          </a:prstGeom>
+          <a:solidFill>
+            <a:srgbClr val="FFFFFF">
+              <a:shade val="85000"/>
+            </a:srgbClr>
+          </a:solidFill>
+          <a:ln w="88900" cap="sq">
+            <a:solidFill>
+              <a:srgbClr val="FFFFFF"/>
+            </a:solidFill>
+            <a:miter lim="800000"/>
+          </a:ln>
+          <a:effectLst>
+            <a:outerShdw blurRad="55000" dist="18000" dir="5400000" algn="tl" rotWithShape="0">
+              <a:srgbClr val="000000">
+                <a:alpha val="40000"/>
+              </a:srgbClr>
+            </a:outerShdw>
+          </a:effectLst>
+          <a:scene3d>
+            <a:camera prst="orthographicFront"/>
+            <a:lightRig rig="twoPt" dir="t">
+              <a:rot lat="0" lon="0" rev="7200000"/>
+            </a:lightRig>
+          </a:scene3d>
+          <a:sp3d>
+            <a:bevelT w="25400" h="19050"/>
+            <a:contourClr>
+              <a:srgbClr val="FFFFFF"/>
+            </a:contourClr>
+          </a:sp3d>
+        </p:spPr>
+      </p:pic>
     </p:spTree>
   </p:cSld>
   <p:clrMapOvr>
@@ -4632,7 +4793,7 @@
 </file>
 
 <file path=ppt/slides/slide9.xml><?xml version="1.0" encoding="utf-8"?>
-<p:sld xmlns:a="http://schemas.openxmlformats.org/drawingml/2006/main" xmlns:r="http://schemas.openxmlformats.org/officeDocument/2006/relationships" xmlns:mc="http://schemas.openxmlformats.org/markup-compatibility/2006" xmlns:mv="urn:schemas-microsoft-com:mac:vml" xmlns:p="http://schemas.openxmlformats.org/presentationml/2006/main" mc:Ignorable="mv" mc:PreserveAttributes="mv:*">
+<p:sld xmlns:a="http://schemas.openxmlformats.org/drawingml/2006/main" xmlns:r="http://schemas.openxmlformats.org/officeDocument/2006/relationships" xmlns:p="http://schemas.openxmlformats.org/presentationml/2006/main">
   <p:cSld>
     <p:spTree>
       <p:nvGrpSpPr>
@@ -4689,7 +4850,7 @@
         </p:spPr>
         <p:txBody>
           <a:bodyPr>
-            <a:normAutofit fontScale="92500" lnSpcReduction="20000"/>
+            <a:normAutofit/>
           </a:bodyPr>
           <a:lstStyle/>
           <a:p>
@@ -4702,33 +4863,71 @@
             <a:pPr lvl="1"/>
             <a:r>
               <a:rPr lang="en-US" dirty="0" smtClean="0"/>
-              <a:t>Fixed and moving gratings over </a:t>
-            </a:r>
-            <a:r>
-              <a:rPr lang="en-US" dirty="0" err="1" smtClean="0"/>
-              <a:t>LEDs</a:t>
+              <a:t>Fixed and moving gratings over LEDs </a:t>
             </a:r>
             <a:r>
               <a:rPr lang="en-US" dirty="0" smtClean="0"/>
-              <a:t> as an alternative to projectors</a:t>
+              <a:t>instead of </a:t>
+            </a:r>
+            <a:r>
+              <a:rPr lang="en-US" dirty="0" smtClean="0"/>
+              <a:t>projectors</a:t>
             </a:r>
           </a:p>
           <a:p>
             <a:pPr lvl="1"/>
             <a:r>
               <a:rPr lang="en-US" dirty="0" smtClean="0"/>
-              <a:t>Highly redundant arrays of cheap CMOS cameras</a:t>
+              <a:t>Redundant </a:t>
+            </a:r>
+            <a:r>
+              <a:rPr lang="en-US" dirty="0" smtClean="0"/>
+              <a:t>arrays of cheap CMOS cameras</a:t>
             </a:r>
           </a:p>
           <a:p>
             <a:pPr lvl="1"/>
             <a:r>
               <a:rPr lang="en-US" dirty="0" smtClean="0"/>
-              <a:t>Reducing error by merging multiple scanning techniques</a:t>
+              <a:t>Merging </a:t>
+            </a:r>
+            <a:r>
+              <a:rPr lang="en-US" dirty="0" smtClean="0"/>
+              <a:t>multiple scanning techniques</a:t>
             </a:r>
           </a:p>
           <a:p>
             <a:pPr lvl="1"/>
+            <a:endParaRPr lang="en-US" dirty="0"/>
+          </a:p>
+        </p:txBody>
+      </p:sp>
+      <p:sp>
+        <p:nvSpPr>
+          <p:cNvPr id="5" name="TextBox 4"/>
+          <p:cNvSpPr txBox="1"/>
+          <p:nvPr/>
+        </p:nvSpPr>
+        <p:spPr>
+          <a:xfrm>
+            <a:off x="5872958" y="3668657"/>
+            <a:ext cx="1855947" cy="369332"/>
+          </a:xfrm>
+          <a:prstGeom prst="rect">
+            <a:avLst/>
+          </a:prstGeom>
+          <a:noFill/>
+        </p:spPr>
+        <p:txBody>
+          <a:bodyPr wrap="none" rtlCol="0">
+            <a:spAutoFit/>
+          </a:bodyPr>
+          <a:lstStyle/>
+          <a:p>
+            <a:r>
+              <a:rPr lang="en-US" dirty="0" smtClean="0"/>
+              <a:t>[CAD model here]</a:t>
+            </a:r>
             <a:endParaRPr lang="en-US" dirty="0"/>
           </a:p>
         </p:txBody>

</xml_diff>

<commit_message>
Changed Gus's picture, made a few edits to Vision and Market, reformatted relevant technology advances
</commit_message>
<xml_diff>
--- a/slides/initial-10-slide-pitch.pptx
+++ b/slides/initial-10-slide-pitch.pptx
@@ -297,7 +297,7 @@
           <a:p>
             <a:fld id="{365CA2CA-CD65-4142-8343-1AFCEEA668AB}" type="datetimeFigureOut">
               <a:rPr lang="en-US" smtClean="0"/>
-              <a:t>3/4/13</a:t>
+              <a:t>3/5/13</a:t>
             </a:fld>
             <a:endParaRPr lang="en-US"/>
           </a:p>
@@ -462,7 +462,7 @@
           <a:p>
             <a:fld id="{365CA2CA-CD65-4142-8343-1AFCEEA668AB}" type="datetimeFigureOut">
               <a:rPr lang="en-US" smtClean="0"/>
-              <a:t>3/4/13</a:t>
+              <a:t>3/5/13</a:t>
             </a:fld>
             <a:endParaRPr lang="en-US"/>
           </a:p>
@@ -637,7 +637,7 @@
           <a:p>
             <a:fld id="{365CA2CA-CD65-4142-8343-1AFCEEA668AB}" type="datetimeFigureOut">
               <a:rPr lang="en-US" smtClean="0"/>
-              <a:t>3/4/13</a:t>
+              <a:t>3/5/13</a:t>
             </a:fld>
             <a:endParaRPr lang="en-US"/>
           </a:p>
@@ -802,7 +802,7 @@
           <a:p>
             <a:fld id="{365CA2CA-CD65-4142-8343-1AFCEEA668AB}" type="datetimeFigureOut">
               <a:rPr lang="en-US" smtClean="0"/>
-              <a:t>3/4/13</a:t>
+              <a:t>3/5/13</a:t>
             </a:fld>
             <a:endParaRPr lang="en-US"/>
           </a:p>
@@ -1043,7 +1043,7 @@
           <a:p>
             <a:fld id="{365CA2CA-CD65-4142-8343-1AFCEEA668AB}" type="datetimeFigureOut">
               <a:rPr lang="en-US" smtClean="0"/>
-              <a:t>3/4/13</a:t>
+              <a:t>3/5/13</a:t>
             </a:fld>
             <a:endParaRPr lang="en-US"/>
           </a:p>
@@ -1326,7 +1326,7 @@
           <a:p>
             <a:fld id="{365CA2CA-CD65-4142-8343-1AFCEEA668AB}" type="datetimeFigureOut">
               <a:rPr lang="en-US" smtClean="0"/>
-              <a:t>3/4/13</a:t>
+              <a:t>3/5/13</a:t>
             </a:fld>
             <a:endParaRPr lang="en-US"/>
           </a:p>
@@ -1743,7 +1743,7 @@
           <a:p>
             <a:fld id="{365CA2CA-CD65-4142-8343-1AFCEEA668AB}" type="datetimeFigureOut">
               <a:rPr lang="en-US" smtClean="0"/>
-              <a:t>3/4/13</a:t>
+              <a:t>3/5/13</a:t>
             </a:fld>
             <a:endParaRPr lang="en-US"/>
           </a:p>
@@ -1856,7 +1856,7 @@
           <a:p>
             <a:fld id="{365CA2CA-CD65-4142-8343-1AFCEEA668AB}" type="datetimeFigureOut">
               <a:rPr lang="en-US" smtClean="0"/>
-              <a:t>3/4/13</a:t>
+              <a:t>3/5/13</a:t>
             </a:fld>
             <a:endParaRPr lang="en-US"/>
           </a:p>
@@ -1946,7 +1946,7 @@
           <a:p>
             <a:fld id="{365CA2CA-CD65-4142-8343-1AFCEEA668AB}" type="datetimeFigureOut">
               <a:rPr lang="en-US" smtClean="0"/>
-              <a:t>3/4/13</a:t>
+              <a:t>3/5/13</a:t>
             </a:fld>
             <a:endParaRPr lang="en-US"/>
           </a:p>
@@ -2218,7 +2218,7 @@
           <a:p>
             <a:fld id="{365CA2CA-CD65-4142-8343-1AFCEEA668AB}" type="datetimeFigureOut">
               <a:rPr lang="en-US" smtClean="0"/>
-              <a:t>3/4/13</a:t>
+              <a:t>3/5/13</a:t>
             </a:fld>
             <a:endParaRPr lang="en-US"/>
           </a:p>
@@ -2466,7 +2466,7 @@
           <a:p>
             <a:fld id="{365CA2CA-CD65-4142-8343-1AFCEEA668AB}" type="datetimeFigureOut">
               <a:rPr lang="en-US" smtClean="0"/>
-              <a:t>3/4/13</a:t>
+              <a:t>3/5/13</a:t>
             </a:fld>
             <a:endParaRPr lang="en-US"/>
           </a:p>
@@ -2674,7 +2674,7 @@
           <a:p>
             <a:fld id="{365CA2CA-CD65-4142-8343-1AFCEEA668AB}" type="datetimeFigureOut">
               <a:rPr lang="en-US" smtClean="0"/>
-              <a:t>3/4/13</a:t>
+              <a:t>3/5/13</a:t>
             </a:fld>
             <a:endParaRPr lang="en-US"/>
           </a:p>
@@ -3260,39 +3260,15 @@
             <a:pPr marL="457200"/>
             <a:r>
               <a:rPr lang="en-US" sz="2000" dirty="0" smtClean="0"/>
-              <a:t>All working in measurement, d</a:t>
+              <a:t>All </a:t>
             </a:r>
             <a:r>
               <a:rPr lang="en-US" sz="2000" dirty="0" smtClean="0"/>
-              <a:t>esign</a:t>
+              <a:t>work in </a:t>
             </a:r>
             <a:r>
               <a:rPr lang="en-US" sz="2000" dirty="0" smtClean="0"/>
-              <a:t>, art, and </a:t>
-            </a:r>
-            <a:r>
-              <a:rPr lang="en-US" sz="2000" dirty="0" smtClean="0"/>
-              <a:t>manufacturing will soon take advantage </a:t>
-            </a:r>
-            <a:r>
-              <a:rPr lang="en-US" sz="2000" dirty="0" smtClean="0"/>
-              <a:t>of the </a:t>
-            </a:r>
-            <a:r>
-              <a:rPr lang="en-US" sz="2000" dirty="0" smtClean="0"/>
-              <a:t>accuracy </a:t>
-            </a:r>
-            <a:r>
-              <a:rPr lang="en-US" sz="2000" dirty="0" smtClean="0"/>
-              <a:t>and speed of 3D </a:t>
-            </a:r>
-            <a:r>
-              <a:rPr lang="en-US" sz="2000" dirty="0" smtClean="0"/>
-              <a:t>scanning.</a:t>
-            </a:r>
-            <a:r>
-              <a:rPr lang="en-US" sz="2000" dirty="0" smtClean="0"/>
-              <a:t/>
+              <a:t>measurement, design, art, and manufacturing will soon take advantage of the accuracy and speed of 3D scanning.</a:t>
             </a:r>
             <a:br>
               <a:rPr lang="en-US" sz="2000" dirty="0" smtClean="0"/>
@@ -3388,13 +3364,23 @@
         </p:spPr>
         <p:txBody>
           <a:bodyPr>
-            <a:normAutofit fontScale="92500" lnSpcReduction="20000"/>
+            <a:normAutofit fontScale="70000" lnSpcReduction="20000"/>
           </a:bodyPr>
           <a:lstStyle/>
           <a:p>
             <a:r>
               <a:rPr lang="en-US" dirty="0" smtClean="0"/>
-              <a:t>Potential users</a:t>
+              <a:t>Existing $350 million 3D scanning market targets large businesses – similar accuracy and lower price exposes a much larger market</a:t>
+            </a:r>
+          </a:p>
+          <a:p>
+            <a:r>
+              <a:rPr lang="en-US" dirty="0" smtClean="0"/>
+              <a:t>Potential </a:t>
+            </a:r>
+            <a:r>
+              <a:rPr lang="en-US" dirty="0" smtClean="0"/>
+              <a:t>users</a:t>
             </a:r>
           </a:p>
           <a:p>
@@ -3429,19 +3415,42 @@
             <a:pPr lvl="1"/>
             <a:r>
               <a:rPr lang="en-US" dirty="0" smtClean="0"/>
-              <a:t>Small </a:t>
-            </a:r>
+              <a:t>Small manufactures</a:t>
+            </a:r>
+          </a:p>
+          <a:p>
             <a:r>
               <a:rPr lang="en-US" dirty="0" smtClean="0"/>
-              <a:t>manufactures</a:t>
-            </a:r>
-          </a:p>
-          <a:p>
+              <a:t>Interest </a:t>
+            </a:r>
             <a:r>
               <a:rPr lang="en-US" dirty="0" smtClean="0"/>
-              <a:t>Interest and growth in 3D printing is expanding wildly.  3D scanning is the other part of this revolution</a:t>
-            </a:r>
-            <a:endParaRPr lang="en-US" dirty="0" smtClean="0"/>
+              <a:t>in and use </a:t>
+            </a:r>
+            <a:r>
+              <a:rPr lang="en-US" dirty="0" smtClean="0"/>
+              <a:t>in </a:t>
+            </a:r>
+            <a:r>
+              <a:rPr lang="en-US" dirty="0" smtClean="0"/>
+              <a:t>3D </a:t>
+            </a:r>
+            <a:r>
+              <a:rPr lang="en-US" dirty="0" smtClean="0"/>
+              <a:t>of printing </a:t>
+            </a:r>
+            <a:r>
+              <a:rPr lang="en-US" dirty="0" smtClean="0"/>
+              <a:t>is </a:t>
+            </a:r>
+            <a:r>
+              <a:rPr lang="en-US" dirty="0" smtClean="0"/>
+              <a:t>growing wildly</a:t>
+            </a:r>
+            <a:r>
+              <a:rPr lang="en-US" dirty="0" smtClean="0"/>
+              <a:t>.  3D scanning is the other part of this revolution</a:t>
+            </a:r>
           </a:p>
           <a:p>
             <a:endParaRPr lang="en-US" dirty="0"/>
@@ -3649,7 +3658,11 @@
           <a:p>
             <a:r>
               <a:rPr lang="en-US" dirty="0" smtClean="0"/>
-              <a:t>Relevant Hardware Advances</a:t>
+              <a:t>Relevant </a:t>
+            </a:r>
+            <a:r>
+              <a:rPr lang="en-US" dirty="0" smtClean="0"/>
+              <a:t>Technology Advances</a:t>
             </a:r>
             <a:endParaRPr lang="en-US" dirty="0"/>
           </a:p>
@@ -3673,28 +3686,59 @@
           <a:lstStyle/>
           <a:p>
             <a:r>
+              <a:rPr lang="en-US" b="1" dirty="0" smtClean="0"/>
+              <a:t>Optics and Digital Imaging </a:t>
+            </a:r>
+            <a:endParaRPr lang="en-US" dirty="0"/>
+          </a:p>
+          <a:p>
+            <a:pPr lvl="1"/>
+            <a:r>
               <a:rPr lang="en-US" dirty="0" smtClean="0"/>
-              <a:t>Optics and Digital Imaging </a:t>
+              <a:t> </a:t>
             </a:r>
             <a:r>
               <a:rPr lang="en-US" dirty="0" smtClean="0"/>
-              <a:t>– Notably emergence of </a:t>
+              <a:t>Notably emergence of high-quality, compact, and cheap cell phone cameras</a:t>
+            </a:r>
+          </a:p>
+          <a:p>
+            <a:r>
+              <a:rPr lang="en-US" b="1" dirty="0" smtClean="0"/>
+              <a:t>Computing</a:t>
             </a:r>
             <a:r>
               <a:rPr lang="en-US" dirty="0" smtClean="0"/>
-              <a:t>high-quality, compact, and cheap cell phone cameras</a:t>
-            </a:r>
-          </a:p>
-          <a:p>
+              <a:t> </a:t>
+            </a:r>
+            <a:endParaRPr lang="en-US" dirty="0" smtClean="0"/>
+          </a:p>
+          <a:p>
+            <a:pPr lvl="1"/>
             <a:r>
               <a:rPr lang="en-US" dirty="0" smtClean="0"/>
-              <a:t>Computing - High-power computers are practically ubiquitous</a:t>
-            </a:r>
-          </a:p>
-          <a:p>
+              <a:t>High</a:t>
+            </a:r>
             <a:r>
               <a:rPr lang="en-US" dirty="0" smtClean="0"/>
-              <a:t>Available manufacturing methods – high-precision laser cutting and CNC machining is now easily attainable</a:t>
+              <a:t>-power computers are practically ubiquitous</a:t>
+            </a:r>
+          </a:p>
+          <a:p>
+            <a:r>
+              <a:rPr lang="en-US" b="1" dirty="0" smtClean="0"/>
+              <a:t>Digital Fabrication</a:t>
+            </a:r>
+          </a:p>
+          <a:p>
+            <a:pPr lvl="1"/>
+            <a:r>
+              <a:rPr lang="en-US" dirty="0" smtClean="0"/>
+              <a:t>High</a:t>
+            </a:r>
+            <a:r>
+              <a:rPr lang="en-US" dirty="0" smtClean="0"/>
+              <a:t>-precision laser cutting and CNC machining is now easily attainable</a:t>
             </a:r>
           </a:p>
           <a:p>
@@ -3824,19 +3868,7 @@
           <a:p>
             <a:r>
               <a:rPr lang="en-US" dirty="0" smtClean="0"/>
-              <a:t>Recent interest in 3D scanning has spurred academic research </a:t>
-            </a:r>
-            <a:r>
-              <a:rPr lang="en-US" dirty="0" smtClean="0"/>
-              <a:t>advances, particularly in </a:t>
-            </a:r>
-            <a:r>
-              <a:rPr lang="en-US" dirty="0" smtClean="0"/>
-              <a:t>structured light and image </a:t>
-            </a:r>
-            <a:r>
-              <a:rPr lang="en-US" dirty="0" smtClean="0"/>
-              <a:t>reconstruction</a:t>
+              <a:t>Recent interest in 3D scanning has spurred academic research advances, particularly in structured light and image reconstruction</a:t>
             </a:r>
             <a:endParaRPr lang="en-US" dirty="0"/>
           </a:p>
@@ -4206,15 +4238,31 @@
           <a:p>
             <a:pPr lvl="1"/>
             <a:r>
+              <a:rPr lang="en-US" sz="2118" dirty="0"/>
+              <a:t>I</a:t>
+            </a:r>
+            <a:r>
               <a:rPr lang="en-US" sz="2118" dirty="0" smtClean="0"/>
-              <a:t>intuitive website and software UI</a:t>
+              <a:t>ntuitive </a:t>
+            </a:r>
+            <a:r>
+              <a:rPr lang="en-US" sz="2118" dirty="0" smtClean="0"/>
+              <a:t>website and software UI</a:t>
             </a:r>
           </a:p>
           <a:p>
             <a:pPr lvl="1"/>
             <a:r>
+              <a:rPr lang="en-US" sz="2118" dirty="0"/>
+              <a:t>C</a:t>
+            </a:r>
+            <a:r>
               <a:rPr lang="en-US" sz="2118" dirty="0" smtClean="0"/>
-              <a:t>computer-controlled calibration</a:t>
+              <a:t>omputer</a:t>
+            </a:r>
+            <a:r>
+              <a:rPr lang="en-US" sz="2118" dirty="0" smtClean="0"/>
+              <a:t>-controlled calibration</a:t>
             </a:r>
           </a:p>
           <a:p>
@@ -4226,15 +4274,31 @@
           <a:p>
             <a:pPr lvl="1"/>
             <a:r>
+              <a:rPr lang="en-US" sz="2118" dirty="0"/>
+              <a:t>E</a:t>
+            </a:r>
+            <a:r>
               <a:rPr lang="en-US" sz="2118" dirty="0" smtClean="0"/>
-              <a:t>easily alter the workspace</a:t>
+              <a:t>asily </a:t>
+            </a:r>
+            <a:r>
+              <a:rPr lang="en-US" sz="2118" dirty="0" smtClean="0"/>
+              <a:t>alter the workspace</a:t>
             </a:r>
           </a:p>
           <a:p>
             <a:pPr lvl="1"/>
             <a:r>
               <a:rPr lang="en-US" sz="2118" dirty="0" smtClean="0"/>
-              <a:t>Enables scanning a single face of large objects, all faces of a small object, or an entire room with one system</a:t>
+              <a:t>Enables scanning a single face of large objects, all faces of a small object, or </a:t>
+            </a:r>
+            <a:r>
+              <a:rPr lang="en-US" sz="2118" dirty="0" smtClean="0"/>
+              <a:t>even an </a:t>
+            </a:r>
+            <a:r>
+              <a:rPr lang="en-US" sz="2118" dirty="0" smtClean="0"/>
+              <a:t>entire room with one system</a:t>
             </a:r>
           </a:p>
           <a:p>
@@ -4314,7 +4378,7 @@
       </p:sp>
       <p:pic>
         <p:nvPicPr>
-          <p:cNvPr id="6" name="Picture 5" descr="Screen Shot 2013-03-04 at 11.05.25 PM.png"/>
+          <p:cNvPr id="7" name="Picture 6" descr="me.jpg"/>
           <p:cNvPicPr>
             <a:picLocks noChangeAspect="1"/>
           </p:cNvPicPr>
@@ -4322,61 +4386,6 @@
         </p:nvPicPr>
         <p:blipFill>
           <a:blip r:embed="rId2"/>
-          <a:srcRect b="24009"/>
-          <a:stretch>
-            <a:fillRect/>
-          </a:stretch>
-        </p:blipFill>
-        <p:spPr>
-          <a:xfrm>
-            <a:off x="4700248" y="2001365"/>
-            <a:ext cx="1225871" cy="1252323"/>
-          </a:xfrm>
-          <a:prstGeom prst="rect">
-            <a:avLst/>
-          </a:prstGeom>
-          <a:solidFill>
-            <a:srgbClr val="FFFFFF">
-              <a:shade val="85000"/>
-            </a:srgbClr>
-          </a:solidFill>
-          <a:ln w="88900" cap="sq">
-            <a:solidFill>
-              <a:srgbClr val="FFFFFF"/>
-            </a:solidFill>
-            <a:miter lim="800000"/>
-          </a:ln>
-          <a:effectLst>
-            <a:outerShdw blurRad="55000" dist="18000" dir="5400000" algn="tl" rotWithShape="0">
-              <a:srgbClr val="000000">
-                <a:alpha val="40000"/>
-              </a:srgbClr>
-            </a:outerShdw>
-          </a:effectLst>
-          <a:scene3d>
-            <a:camera prst="orthographicFront"/>
-            <a:lightRig rig="twoPt" dir="t">
-              <a:rot lat="0" lon="0" rev="7200000"/>
-            </a:lightRig>
-          </a:scene3d>
-          <a:sp3d>
-            <a:bevelT w="25400" h="19050"/>
-            <a:contourClr>
-              <a:srgbClr val="FFFFFF"/>
-            </a:contourClr>
-          </a:sp3d>
-        </p:spPr>
-      </p:pic>
-      <p:pic>
-        <p:nvPicPr>
-          <p:cNvPr id="7" name="Picture 6" descr="me.jpg"/>
-          <p:cNvPicPr>
-            <a:picLocks noChangeAspect="1"/>
-          </p:cNvPicPr>
-          <p:nvPr/>
-        </p:nvPicPr>
-        <p:blipFill>
-          <a:blip r:embed="rId3"/>
           <a:stretch>
             <a:fillRect/>
           </a:stretch>
@@ -4595,7 +4604,7 @@
             </a:r>
             <a:r>
               <a:rPr lang="en-US" sz="1400" dirty="0" smtClean="0"/>
-              <a:t> Physics</a:t>
+              <a:t> Physics, Math</a:t>
             </a:r>
           </a:p>
           <a:p>
@@ -4680,7 +4689,7 @@
           <p:nvPr/>
         </p:nvPicPr>
         <p:blipFill rotWithShape="1">
-          <a:blip r:embed="rId4">
+          <a:blip r:embed="rId3">
             <a:extLst>
               <a:ext uri="{28A0092B-C50C-407E-A947-70E740481C1C}">
                 <a14:useLocalDpi xmlns:a14="http://schemas.microsoft.com/office/drawing/2010/main" val="0"/>
@@ -4739,7 +4748,7 @@
           <p:nvPr/>
         </p:nvPicPr>
         <p:blipFill>
-          <a:blip r:embed="rId5"/>
+          <a:blip r:embed="rId4"/>
           <a:stretch>
             <a:fillRect/>
           </a:stretch>
@@ -4784,6 +4793,42 @@
           </a:sp3d>
         </p:spPr>
       </p:pic>
+      <p:pic>
+        <p:nvPicPr>
+          <p:cNvPr id="5" name="Picture 4"/>
+          <p:cNvPicPr>
+            <a:picLocks noChangeAspect="1"/>
+          </p:cNvPicPr>
+          <p:nvPr/>
+        </p:nvPicPr>
+        <p:blipFill>
+          <a:blip r:embed="rId5"/>
+          <a:stretch>
+            <a:fillRect/>
+          </a:stretch>
+        </p:blipFill>
+        <p:spPr>
+          <a:xfrm>
+            <a:off x="4700247" y="1952626"/>
+            <a:ext cx="1295169" cy="1322280"/>
+          </a:xfrm>
+          <a:prstGeom prst="rect">
+            <a:avLst/>
+          </a:prstGeom>
+          <a:ln w="76200" cmpd="sng">
+            <a:solidFill>
+              <a:srgbClr val="FFFFFF"/>
+            </a:solidFill>
+          </a:ln>
+          <a:effectLst>
+            <a:outerShdw blurRad="50800" dist="38100" dir="5400000" algn="t" rotWithShape="0">
+              <a:prstClr val="black">
+                <a:alpha val="40000"/>
+              </a:prstClr>
+            </a:outerShdw>
+          </a:effectLst>
+        </p:spPr>
+      </p:pic>
     </p:spTree>
   </p:cSld>
   <p:clrMapOvr>
@@ -4863,37 +4908,21 @@
             <a:pPr lvl="1"/>
             <a:r>
               <a:rPr lang="en-US" dirty="0" smtClean="0"/>
-              <a:t>Fixed and moving gratings over LEDs </a:t>
-            </a:r>
+              <a:t>Fixed and moving gratings over LEDs instead of projectors</a:t>
+            </a:r>
+          </a:p>
+          <a:p>
+            <a:pPr lvl="1"/>
             <a:r>
               <a:rPr lang="en-US" dirty="0" smtClean="0"/>
-              <a:t>instead of </a:t>
-            </a:r>
+              <a:t>Redundant arrays of cheap CMOS cameras</a:t>
+            </a:r>
+          </a:p>
+          <a:p>
+            <a:pPr lvl="1"/>
             <a:r>
               <a:rPr lang="en-US" dirty="0" smtClean="0"/>
-              <a:t>projectors</a:t>
-            </a:r>
-          </a:p>
-          <a:p>
-            <a:pPr lvl="1"/>
-            <a:r>
-              <a:rPr lang="en-US" dirty="0" smtClean="0"/>
-              <a:t>Redundant </a:t>
-            </a:r>
-            <a:r>
-              <a:rPr lang="en-US" dirty="0" smtClean="0"/>
-              <a:t>arrays of cheap CMOS cameras</a:t>
-            </a:r>
-          </a:p>
-          <a:p>
-            <a:pPr lvl="1"/>
-            <a:r>
-              <a:rPr lang="en-US" dirty="0" smtClean="0"/>
-              <a:t>Merging </a:t>
-            </a:r>
-            <a:r>
-              <a:rPr lang="en-US" dirty="0" smtClean="0"/>
-              <a:t>multiple scanning techniques</a:t>
+              <a:t>Merging multiple scanning techniques</a:t>
             </a:r>
           </a:p>
           <a:p>

</xml_diff>

<commit_message>
Changed 3D printer growth market chart to be a powerpoint chart
</commit_message>
<xml_diff>
--- a/slides/initial-10-slide-pitch.pptx
+++ b/slides/initial-10-slide-pitch.pptx
@@ -114,6 +114,450 @@
     </a:lvl9pPr>
   </p:defaultTextStyle>
 </p:presentation>
+</file>
+
+<file path=ppt/charts/chart1.xml><?xml version="1.0" encoding="utf-8"?>
+<c:chartSpace xmlns:c="http://schemas.openxmlformats.org/drawingml/2006/chart" xmlns:a="http://schemas.openxmlformats.org/drawingml/2006/main" xmlns:r="http://schemas.openxmlformats.org/officeDocument/2006/relationships">
+  <c:date1904 val="0"/>
+  <c:lang val="en-US"/>
+  <c:roundedCorners val="0"/>
+  <mc:AlternateContent xmlns:mc="http://schemas.openxmlformats.org/markup-compatibility/2006">
+    <mc:Choice xmlns:c14="http://schemas.microsoft.com/office/drawing/2007/8/2/chart" Requires="c14">
+      <c14:style val="118"/>
+    </mc:Choice>
+    <mc:Fallback>
+      <c:style val="18"/>
+    </mc:Fallback>
+  </mc:AlternateContent>
+  <c:chart>
+    <c:title>
+      <c:tx>
+        <c:rich>
+          <a:bodyPr/>
+          <a:lstStyle/>
+          <a:p>
+            <a:pPr marL="0" marR="0" indent="0" algn="ctr" defTabSz="914400" rtl="0" eaLnBrk="1" fontAlgn="auto" latinLnBrk="0" hangingPunct="1">
+              <a:lnSpc>
+                <a:spcPct val="100000"/>
+              </a:lnSpc>
+              <a:spcBef>
+                <a:spcPts val="0"/>
+              </a:spcBef>
+              <a:spcAft>
+                <a:spcPts val="0"/>
+              </a:spcAft>
+              <a:buClrTx/>
+              <a:buSzTx/>
+              <a:buFontTx/>
+              <a:buNone/>
+              <a:tabLst/>
+              <a:defRPr sz="2160" b="1" i="0" u="none" strike="noStrike" kern="1200" baseline="0">
+                <a:solidFill>
+                  <a:prstClr val="black"/>
+                </a:solidFill>
+                <a:latin typeface="Calibri"/>
+                <a:ea typeface="+mn-ea"/>
+                <a:cs typeface="Calibri"/>
+              </a:defRPr>
+            </a:pPr>
+            <a:r>
+              <a:rPr lang="en-US" sz="1800" dirty="0" smtClean="0"/>
+              <a:t>Global Personal</a:t>
+            </a:r>
+            <a:r>
+              <a:rPr lang="en-US" sz="1800" baseline="0" dirty="0" smtClean="0"/>
+              <a:t> 3D Printer Sales</a:t>
+            </a:r>
+          </a:p>
+          <a:p>
+            <a:pPr marL="0" marR="0" indent="0" algn="ctr" defTabSz="914400" rtl="0" eaLnBrk="1" fontAlgn="auto" latinLnBrk="0" hangingPunct="1">
+              <a:lnSpc>
+                <a:spcPct val="100000"/>
+              </a:lnSpc>
+              <a:spcBef>
+                <a:spcPts val="0"/>
+              </a:spcBef>
+              <a:spcAft>
+                <a:spcPts val="0"/>
+              </a:spcAft>
+              <a:buClrTx/>
+              <a:buSzTx/>
+              <a:buFontTx/>
+              <a:buNone/>
+              <a:tabLst/>
+              <a:defRPr sz="2160" b="1" i="0" u="none" strike="noStrike" kern="1200" baseline="0">
+                <a:solidFill>
+                  <a:prstClr val="black"/>
+                </a:solidFill>
+                <a:latin typeface="Calibri"/>
+                <a:ea typeface="+mn-ea"/>
+                <a:cs typeface="Calibri"/>
+              </a:defRPr>
+            </a:pPr>
+            <a:r>
+              <a:rPr lang="en-US" sz="1200" b="0" dirty="0" smtClean="0">
+                <a:effectLst/>
+              </a:rPr>
+              <a:t>Machines or kits priced between $500 and $4,000</a:t>
+            </a:r>
+            <a:endParaRPr lang="en-US" sz="1600" b="0" dirty="0" smtClean="0">
+              <a:effectLst/>
+            </a:endParaRPr>
+          </a:p>
+          <a:p>
+            <a:pPr marL="0" marR="0" indent="0" algn="ctr" defTabSz="914400" rtl="0" eaLnBrk="1" fontAlgn="auto" latinLnBrk="0" hangingPunct="1">
+              <a:lnSpc>
+                <a:spcPct val="100000"/>
+              </a:lnSpc>
+              <a:spcBef>
+                <a:spcPts val="0"/>
+              </a:spcBef>
+              <a:spcAft>
+                <a:spcPts val="0"/>
+              </a:spcAft>
+              <a:buClrTx/>
+              <a:buSzTx/>
+              <a:buFontTx/>
+              <a:buNone/>
+              <a:tabLst/>
+              <a:defRPr sz="2160" b="1" i="0" u="none" strike="noStrike" kern="1200" baseline="0">
+                <a:solidFill>
+                  <a:prstClr val="black"/>
+                </a:solidFill>
+                <a:latin typeface="Calibri"/>
+                <a:ea typeface="+mn-ea"/>
+                <a:cs typeface="Calibri"/>
+              </a:defRPr>
+            </a:pPr>
+            <a:endParaRPr lang="en-US" dirty="0"/>
+          </a:p>
+        </c:rich>
+      </c:tx>
+      <c:layout/>
+      <c:overlay val="1"/>
+    </c:title>
+    <c:autoTitleDeleted val="0"/>
+    <c:view3D>
+      <c:rotX val="15"/>
+      <c:rotY val="20"/>
+      <c:rAngAx val="1"/>
+    </c:view3D>
+    <c:floor>
+      <c:thickness val="0"/>
+    </c:floor>
+    <c:sideWall>
+      <c:thickness val="0"/>
+    </c:sideWall>
+    <c:backWall>
+      <c:thickness val="0"/>
+    </c:backWall>
+    <c:plotArea>
+      <c:layout/>
+      <c:bar3DChart>
+        <c:barDir val="col"/>
+        <c:grouping val="standard"/>
+        <c:varyColors val="0"/>
+        <c:ser>
+          <c:idx val="0"/>
+          <c:order val="0"/>
+          <c:tx>
+            <c:strRef>
+              <c:f>Sheet1!$B$1</c:f>
+              <c:strCache>
+                <c:ptCount val="1"/>
+                <c:pt idx="0">
+                  <c:v>Series 1</c:v>
+                </c:pt>
+              </c:strCache>
+            </c:strRef>
+          </c:tx>
+          <c:invertIfNegative val="0"/>
+          <c:dLbls>
+            <c:dLbl>
+              <c:idx val="0"/>
+              <c:layout>
+                <c:manualLayout>
+                  <c:x val="0.0208331897280167"/>
+                  <c:y val="-0.00683987553362151"/>
+                </c:manualLayout>
+              </c:layout>
+              <c:showLegendKey val="0"/>
+              <c:showVal val="1"/>
+              <c:showCatName val="0"/>
+              <c:showSerName val="0"/>
+              <c:showPercent val="0"/>
+              <c:showBubbleSize val="0"/>
+            </c:dLbl>
+            <c:dLbl>
+              <c:idx val="1"/>
+              <c:layout>
+                <c:manualLayout>
+                  <c:x val="0.0187500000000001"/>
+                  <c:y val="-0.00628500778202743"/>
+                </c:manualLayout>
+              </c:layout>
+              <c:showLegendKey val="0"/>
+              <c:showVal val="1"/>
+              <c:showCatName val="0"/>
+              <c:showSerName val="0"/>
+              <c:showPercent val="0"/>
+              <c:showBubbleSize val="0"/>
+            </c:dLbl>
+            <c:dLbl>
+              <c:idx val="2"/>
+              <c:layout>
+                <c:manualLayout>
+                  <c:x val="0.0145833333333333"/>
+                  <c:y val="-0.00838001037603647"/>
+                </c:manualLayout>
+              </c:layout>
+              <c:showLegendKey val="0"/>
+              <c:showVal val="1"/>
+              <c:showCatName val="0"/>
+              <c:showSerName val="0"/>
+              <c:showPercent val="0"/>
+              <c:showBubbleSize val="0"/>
+            </c:dLbl>
+            <c:dLbl>
+              <c:idx val="3"/>
+              <c:layout>
+                <c:manualLayout>
+                  <c:x val="0.0145833333333333"/>
+                  <c:y val="-0.00628500778202735"/>
+                </c:manualLayout>
+              </c:layout>
+              <c:showLegendKey val="0"/>
+              <c:showVal val="1"/>
+              <c:showCatName val="0"/>
+              <c:showSerName val="0"/>
+              <c:showPercent val="0"/>
+              <c:showBubbleSize val="0"/>
+            </c:dLbl>
+            <c:dLbl>
+              <c:idx val="4"/>
+              <c:layout>
+                <c:manualLayout>
+                  <c:x val="0.0145830901946765"/>
+                  <c:y val="-0.000554743030349816"/>
+                </c:manualLayout>
+              </c:layout>
+              <c:showLegendKey val="0"/>
+              <c:showVal val="1"/>
+              <c:showCatName val="0"/>
+              <c:showSerName val="0"/>
+              <c:showPercent val="0"/>
+              <c:showBubbleSize val="0"/>
+            </c:dLbl>
+            <c:numFmt formatCode="#,##0" sourceLinked="0"/>
+            <c:txPr>
+              <a:bodyPr/>
+              <a:lstStyle/>
+              <a:p>
+                <a:pPr>
+                  <a:defRPr sz="1200"/>
+                </a:pPr>
+                <a:endParaRPr lang="en-US"/>
+              </a:p>
+            </c:txPr>
+            <c:showLegendKey val="0"/>
+            <c:showVal val="1"/>
+            <c:showCatName val="0"/>
+            <c:showSerName val="0"/>
+            <c:showPercent val="0"/>
+            <c:showBubbleSize val="0"/>
+            <c:showLeaderLines val="0"/>
+          </c:dLbls>
+          <c:cat>
+            <c:numRef>
+              <c:f>Sheet1!$A$2:$A$6</c:f>
+              <c:numCache>
+                <c:formatCode>General</c:formatCode>
+                <c:ptCount val="5"/>
+                <c:pt idx="0">
+                  <c:v>2007.0</c:v>
+                </c:pt>
+                <c:pt idx="1">
+                  <c:v>2008.0</c:v>
+                </c:pt>
+                <c:pt idx="2">
+                  <c:v>2009.0</c:v>
+                </c:pt>
+                <c:pt idx="3">
+                  <c:v>2010.0</c:v>
+                </c:pt>
+                <c:pt idx="4">
+                  <c:v>2011.0</c:v>
+                </c:pt>
+              </c:numCache>
+            </c:numRef>
+          </c:cat>
+          <c:val>
+            <c:numRef>
+              <c:f>Sheet1!$B$2:$B$6</c:f>
+              <c:numCache>
+                <c:formatCode>General</c:formatCode>
+                <c:ptCount val="5"/>
+                <c:pt idx="0">
+                  <c:v>66.0</c:v>
+                </c:pt>
+                <c:pt idx="1">
+                  <c:v>355.0</c:v>
+                </c:pt>
+                <c:pt idx="2">
+                  <c:v>1816.0</c:v>
+                </c:pt>
+                <c:pt idx="3">
+                  <c:v>5978.0</c:v>
+                </c:pt>
+                <c:pt idx="4">
+                  <c:v>23265.0</c:v>
+                </c:pt>
+              </c:numCache>
+            </c:numRef>
+          </c:val>
+        </c:ser>
+        <c:dLbls>
+          <c:showLegendKey val="0"/>
+          <c:showVal val="0"/>
+          <c:showCatName val="0"/>
+          <c:showSerName val="0"/>
+          <c:showPercent val="0"/>
+          <c:showBubbleSize val="0"/>
+        </c:dLbls>
+        <c:gapWidth val="150"/>
+        <c:shape val="box"/>
+        <c:axId val="2117576408"/>
+        <c:axId val="2117714568"/>
+        <c:axId val="2117389928"/>
+      </c:bar3DChart>
+      <c:catAx>
+        <c:axId val="2117576408"/>
+        <c:scaling>
+          <c:orientation val="minMax"/>
+        </c:scaling>
+        <c:delete val="0"/>
+        <c:axPos val="b"/>
+        <c:title>
+          <c:tx>
+            <c:rich>
+              <a:bodyPr/>
+              <a:lstStyle/>
+              <a:p>
+                <a:pPr>
+                  <a:defRPr sz="1400"/>
+                </a:pPr>
+                <a:r>
+                  <a:rPr lang="en-US" sz="1400" dirty="0" smtClean="0"/>
+                  <a:t>Year</a:t>
+                </a:r>
+                <a:endParaRPr lang="en-US" sz="1400" dirty="0"/>
+              </a:p>
+            </c:rich>
+          </c:tx>
+          <c:layout/>
+          <c:overlay val="0"/>
+        </c:title>
+        <c:numFmt formatCode="General" sourceLinked="1"/>
+        <c:majorTickMark val="out"/>
+        <c:minorTickMark val="none"/>
+        <c:tickLblPos val="nextTo"/>
+        <c:txPr>
+          <a:bodyPr/>
+          <a:lstStyle/>
+          <a:p>
+            <a:pPr>
+              <a:defRPr sz="1400"/>
+            </a:pPr>
+            <a:endParaRPr lang="en-US"/>
+          </a:p>
+        </c:txPr>
+        <c:crossAx val="2117714568"/>
+        <c:crosses val="autoZero"/>
+        <c:auto val="1"/>
+        <c:lblAlgn val="ctr"/>
+        <c:lblOffset val="100"/>
+        <c:noMultiLvlLbl val="0"/>
+      </c:catAx>
+      <c:valAx>
+        <c:axId val="2117714568"/>
+        <c:scaling>
+          <c:orientation val="minMax"/>
+        </c:scaling>
+        <c:delete val="0"/>
+        <c:axPos val="l"/>
+        <c:majorGridlines/>
+        <c:title>
+          <c:tx>
+            <c:rich>
+              <a:bodyPr rot="-5400000" vert="horz"/>
+              <a:lstStyle/>
+              <a:p>
+                <a:pPr>
+                  <a:defRPr sz="1400"/>
+                </a:pPr>
+                <a:r>
+                  <a:rPr lang="en-US" sz="1400"/>
+                  <a:t>Units Sold</a:t>
+                </a:r>
+              </a:p>
+            </c:rich>
+          </c:tx>
+          <c:layout/>
+          <c:overlay val="0"/>
+        </c:title>
+        <c:numFmt formatCode="#,##0" sourceLinked="0"/>
+        <c:majorTickMark val="out"/>
+        <c:minorTickMark val="none"/>
+        <c:tickLblPos val="nextTo"/>
+        <c:txPr>
+          <a:bodyPr/>
+          <a:lstStyle/>
+          <a:p>
+            <a:pPr>
+              <a:defRPr sz="1400"/>
+            </a:pPr>
+            <a:endParaRPr lang="en-US"/>
+          </a:p>
+        </c:txPr>
+        <c:crossAx val="2117576408"/>
+        <c:crosses val="autoZero"/>
+        <c:crossBetween val="between"/>
+      </c:valAx>
+      <c:serAx>
+        <c:axId val="2117389928"/>
+        <c:scaling>
+          <c:orientation val="minMax"/>
+        </c:scaling>
+        <c:delete val="1"/>
+        <c:axPos val="b"/>
+        <c:majorTickMark val="out"/>
+        <c:minorTickMark val="none"/>
+        <c:tickLblPos val="nextTo"/>
+        <c:crossAx val="2117714568"/>
+        <c:crosses val="autoZero"/>
+      </c:serAx>
+    </c:plotArea>
+    <c:plotVisOnly val="1"/>
+    <c:dispBlanksAs val="gap"/>
+    <c:showDLblsOverMax val="0"/>
+  </c:chart>
+  <c:txPr>
+    <a:bodyPr/>
+    <a:lstStyle/>
+    <a:p>
+      <a:pPr>
+        <a:defRPr sz="1800">
+          <a:latin typeface="Calibri"/>
+          <a:cs typeface="Calibri"/>
+        </a:defRPr>
+      </a:pPr>
+      <a:endParaRPr lang="en-US"/>
+    </a:p>
+  </c:txPr>
+  <c:externalData r:id="rId1">
+    <c:autoUpdate val="0"/>
+  </c:externalData>
+</c:chartSpace>
 </file>
 
 <file path=ppt/slideLayouts/slideLayout1.xml><?xml version="1.0" encoding="utf-8"?>
@@ -3323,6 +3767,28 @@
           <a:chExt cx="0" cy="0"/>
         </a:xfrm>
       </p:grpSpPr>
+      <p:graphicFrame>
+        <p:nvGraphicFramePr>
+          <p:cNvPr id="9" name="Chart 8"/>
+          <p:cNvGraphicFramePr/>
+          <p:nvPr>
+            <p:extLst>
+              <p:ext uri="{D42A27DB-BD31-4B8C-83A1-F6EECF244321}">
+                <p14:modId xmlns:p14="http://schemas.microsoft.com/office/powerpoint/2010/main" val="2708659999"/>
+              </p:ext>
+            </p:extLst>
+          </p:nvPr>
+        </p:nvGraphicFramePr>
+        <p:xfrm>
+          <a:off x="4479666" y="1594553"/>
+          <a:ext cx="4207133" cy="4432683"/>
+        </p:xfrm>
+        <a:graphic>
+          <a:graphicData uri="http://schemas.openxmlformats.org/drawingml/2006/chart">
+            <c:chart xmlns:c="http://schemas.openxmlformats.org/drawingml/2006/chart" xmlns:r="http://schemas.openxmlformats.org/officeDocument/2006/relationships" r:id="rId2"/>
+          </a:graphicData>
+        </a:graphic>
+      </p:graphicFrame>
       <p:sp>
         <p:nvSpPr>
           <p:cNvPr id="2" name="Title 1"/>
@@ -3515,29 +3981,6 @@
           </a:p>
         </p:txBody>
       </p:sp>
-      <p:pic>
-        <p:nvPicPr>
-          <p:cNvPr id="6" name="Picture 5"/>
-          <p:cNvPicPr>
-            <a:picLocks noChangeAspect="1"/>
-          </p:cNvPicPr>
-          <p:nvPr/>
-        </p:nvPicPr>
-        <p:blipFill rotWithShape="1">
-          <a:blip r:embed="rId2"/>
-          <a:srcRect l="2961" t="3290" r="2324" b="6903"/>
-          <a:stretch/>
-        </p:blipFill>
-        <p:spPr>
-          <a:xfrm>
-            <a:off x="5002882" y="2168657"/>
-            <a:ext cx="3535185" cy="3297468"/>
-          </a:xfrm>
-          <a:prstGeom prst="rect">
-            <a:avLst/>
-          </a:prstGeom>
-        </p:spPr>
-      </p:pic>
       <p:sp>
         <p:nvSpPr>
           <p:cNvPr id="7" name="TextBox 6"/>
@@ -3546,7 +3989,7 @@
         </p:nvSpPr>
         <p:spPr>
           <a:xfrm>
-            <a:off x="5002882" y="5466125"/>
+            <a:off x="5002882" y="5266070"/>
             <a:ext cx="3535185" cy="400110"/>
           </a:xfrm>
           <a:prstGeom prst="rect">
@@ -3562,57 +4005,9 @@
           <a:p>
             <a:r>
               <a:rPr lang="en-US" sz="1000" i="1" dirty="0" smtClean="0"/>
-              <a:t>Data from </a:t>
-            </a:r>
-            <a:r>
-              <a:rPr lang="en-US" sz="1000" i="1" dirty="0" err="1" smtClean="0"/>
-              <a:t>Wohlers</a:t>
-            </a:r>
-            <a:r>
-              <a:rPr lang="en-US" sz="1000" i="1" dirty="0" smtClean="0"/>
-              <a:t> Report 2012: Additive Manufacturing and 3D Printing State of the Industry</a:t>
+              <a:t>Data from Wohlers Report 2012: Additive Manufacturing and 3D Printing State of the Industry</a:t>
             </a:r>
             <a:endParaRPr lang="en-US" sz="1000" i="1" dirty="0"/>
-          </a:p>
-        </p:txBody>
-      </p:sp>
-      <p:sp>
-        <p:nvSpPr>
-          <p:cNvPr id="8" name="TextBox 7"/>
-          <p:cNvSpPr txBox="1"/>
-          <p:nvPr/>
-        </p:nvSpPr>
-        <p:spPr>
-          <a:xfrm>
-            <a:off x="5002882" y="1600200"/>
-            <a:ext cx="3535185" cy="584776"/>
-          </a:xfrm>
-          <a:prstGeom prst="rect">
-            <a:avLst/>
-          </a:prstGeom>
-          <a:noFill/>
-        </p:spPr>
-        <p:txBody>
-          <a:bodyPr wrap="square" rtlCol="0">
-            <a:spAutoFit/>
-          </a:bodyPr>
-          <a:lstStyle/>
-          <a:p>
-            <a:r>
-              <a:rPr lang="en-US" sz="2000" dirty="0" smtClean="0"/>
-              <a:t>Global personal 3D printer sales </a:t>
-            </a:r>
-          </a:p>
-          <a:p>
-            <a:r>
-              <a:rPr lang="en-US" sz="1200" dirty="0"/>
-              <a:t>M</a:t>
-            </a:r>
-            <a:r>
-              <a:rPr lang="en-US" sz="1200" dirty="0" smtClean="0"/>
-              <a:t>achines or kits priced between $500 and $4,000</a:t>
-            </a:r>
-            <a:endParaRPr lang="en-US" sz="1200" dirty="0"/>
           </a:p>
         </p:txBody>
       </p:sp>

</xml_diff>